<commit_message>
Update Tree-Based Model in R.pptx
</commit_message>
<xml_diff>
--- a/Track - Machine Learning/Tree-Based-Models-in-R/Tree-Based Model in R.pptx
+++ b/Track - Machine Learning/Tree-Based-Models-in-R/Tree-Based Model in R.pptx
@@ -11,6 +11,7 @@
     <p:sldId id="258" r:id="rId5"/>
     <p:sldId id="265" r:id="rId6"/>
     <p:sldId id="266" r:id="rId7"/>
+    <p:sldId id="267" r:id="rId8"/>
   </p:sldIdLst>
   <p:sldSz cx="9144000" cy="6858000" type="screen4x3"/>
   <p:notesSz cx="7010400" cy="9296400"/>
@@ -260,7 +261,7 @@
             <a:fld id="{B61BEF0D-F0BB-DE4B-95CE-6DB70DBA9567}" type="datetimeFigureOut">
               <a:rPr lang="en-US" smtClean="0"/>
               <a:pPr/>
-              <a:t>6/4/2019</a:t>
+              <a:t>6/5/2019</a:t>
             </a:fld>
             <a:endParaRPr lang="en-US" dirty="0"/>
           </a:p>
@@ -432,7 +433,7 @@
             <a:fld id="{B61BEF0D-F0BB-DE4B-95CE-6DB70DBA9567}" type="datetimeFigureOut">
               <a:rPr lang="en-US" smtClean="0"/>
               <a:pPr/>
-              <a:t>6/4/2019</a:t>
+              <a:t>6/5/2019</a:t>
             </a:fld>
             <a:endParaRPr lang="en-US" dirty="0"/>
           </a:p>
@@ -614,7 +615,7 @@
             <a:fld id="{B61BEF0D-F0BB-DE4B-95CE-6DB70DBA9567}" type="datetimeFigureOut">
               <a:rPr lang="en-US" smtClean="0"/>
               <a:pPr/>
-              <a:t>6/4/2019</a:t>
+              <a:t>6/5/2019</a:t>
             </a:fld>
             <a:endParaRPr lang="en-US" dirty="0"/>
           </a:p>
@@ -786,7 +787,7 @@
             <a:fld id="{B61BEF0D-F0BB-DE4B-95CE-6DB70DBA9567}" type="datetimeFigureOut">
               <a:rPr lang="en-US" smtClean="0"/>
               <a:pPr/>
-              <a:t>6/4/2019</a:t>
+              <a:t>6/5/2019</a:t>
             </a:fld>
             <a:endParaRPr lang="en-US" dirty="0"/>
           </a:p>
@@ -1032,7 +1033,7 @@
             <a:fld id="{B61BEF0D-F0BB-DE4B-95CE-6DB70DBA9567}" type="datetimeFigureOut">
               <a:rPr lang="en-US" smtClean="0"/>
               <a:pPr/>
-              <a:t>6/4/2019</a:t>
+              <a:t>6/5/2019</a:t>
             </a:fld>
             <a:endParaRPr lang="en-US" dirty="0"/>
           </a:p>
@@ -1266,7 +1267,7 @@
             <a:fld id="{B61BEF0D-F0BB-DE4B-95CE-6DB70DBA9567}" type="datetimeFigureOut">
               <a:rPr lang="en-US" smtClean="0"/>
               <a:pPr/>
-              <a:t>6/4/2019</a:t>
+              <a:t>6/5/2019</a:t>
             </a:fld>
             <a:endParaRPr lang="en-US" dirty="0"/>
           </a:p>
@@ -1635,7 +1636,7 @@
             <a:fld id="{B61BEF0D-F0BB-DE4B-95CE-6DB70DBA9567}" type="datetimeFigureOut">
               <a:rPr lang="en-US" smtClean="0"/>
               <a:pPr/>
-              <a:t>6/4/2019</a:t>
+              <a:t>6/5/2019</a:t>
             </a:fld>
             <a:endParaRPr lang="en-US" dirty="0"/>
           </a:p>
@@ -1755,7 +1756,7 @@
             <a:fld id="{B61BEF0D-F0BB-DE4B-95CE-6DB70DBA9567}" type="datetimeFigureOut">
               <a:rPr lang="en-US" smtClean="0"/>
               <a:pPr/>
-              <a:t>6/4/2019</a:t>
+              <a:t>6/5/2019</a:t>
             </a:fld>
             <a:endParaRPr lang="en-US" dirty="0"/>
           </a:p>
@@ -1852,7 +1853,7 @@
             <a:fld id="{B61BEF0D-F0BB-DE4B-95CE-6DB70DBA9567}" type="datetimeFigureOut">
               <a:rPr lang="en-US" smtClean="0"/>
               <a:pPr/>
-              <a:t>6/4/2019</a:t>
+              <a:t>6/5/2019</a:t>
             </a:fld>
             <a:endParaRPr lang="en-US" dirty="0"/>
           </a:p>
@@ -2131,7 +2132,7 @@
             <a:fld id="{B61BEF0D-F0BB-DE4B-95CE-6DB70DBA9567}" type="datetimeFigureOut">
               <a:rPr lang="en-US" smtClean="0"/>
               <a:pPr/>
-              <a:t>6/4/2019</a:t>
+              <a:t>6/5/2019</a:t>
             </a:fld>
             <a:endParaRPr lang="en-US" dirty="0"/>
           </a:p>
@@ -2390,7 +2391,7 @@
             <a:fld id="{B61BEF0D-F0BB-DE4B-95CE-6DB70DBA9567}" type="datetimeFigureOut">
               <a:rPr lang="en-US" smtClean="0"/>
               <a:pPr/>
-              <a:t>6/4/2019</a:t>
+              <a:t>6/5/2019</a:t>
             </a:fld>
             <a:endParaRPr lang="en-US" dirty="0"/>
           </a:p>
@@ -2605,7 +2606,7 @@
             <a:fld id="{B61BEF0D-F0BB-DE4B-95CE-6DB70DBA9567}" type="datetimeFigureOut">
               <a:rPr lang="en-US" smtClean="0"/>
               <a:pPr/>
-              <a:t>6/4/2019</a:t>
+              <a:t>6/5/2019</a:t>
             </a:fld>
             <a:endParaRPr lang="en-US" dirty="0"/>
           </a:p>
@@ -3544,7 +3545,11 @@
             </a:pPr>
             <a:r>
               <a:rPr lang="en-US" sz="1050" smtClean="0"/>
-              <a:t>Predic on a test set and compute AUC</a:t>
+              <a:t>Predict </a:t>
+            </a:r>
+            <a:r>
+              <a:rPr lang="en-US" sz="1050" smtClean="0"/>
+              <a:t>on a test set and compute AUC</a:t>
             </a:r>
             <a:endParaRPr lang="en-US" sz="1050" dirty="0"/>
           </a:p>
@@ -4893,17 +4898,7 @@
                   </a:schemeClr>
                 </a:solidFill>
               </a:rPr>
-              <a:t>grade </a:t>
-            </a:r>
-            <a:r>
-              <a:rPr lang="en-US" sz="1050" b="1" smtClean="0">
-                <a:solidFill>
-                  <a:schemeClr val="accent2">
-                    <a:lumMod val="75000"/>
-                  </a:schemeClr>
-                </a:solidFill>
-              </a:rPr>
-              <a:t>is a data frame</a:t>
+              <a:t>grade is a data frame</a:t>
             </a:r>
           </a:p>
           <a:p>
@@ -4983,9 +4978,6 @@
               </a:rPr>
               <a:t>grade_valid &lt;- grade[assignment == 2, ]</a:t>
             </a:r>
-            <a:endParaRPr lang="en-US" sz="1050" smtClean="0">
-              <a:latin typeface="Consolas" panose="020B0609020204030204" pitchFamily="49" charset="0"/>
-            </a:endParaRPr>
           </a:p>
           <a:p>
             <a:r>
@@ -4998,13 +4990,7 @@
               <a:rPr lang="en-US" sz="1050">
                 <a:latin typeface="Consolas" panose="020B0609020204030204" pitchFamily="49" charset="0"/>
               </a:rPr>
-              <a:t>&lt;- grade[assignment </a:t>
-            </a:r>
-            <a:r>
-              <a:rPr lang="en-US" sz="1050">
-                <a:latin typeface="Consolas" panose="020B0609020204030204" pitchFamily="49" charset="0"/>
-              </a:rPr>
-              <a:t>== </a:t>
+              <a:t>&lt;- grade[assignment == </a:t>
             </a:r>
             <a:r>
               <a:rPr lang="en-US" sz="1050" smtClean="0">
@@ -5029,25 +5015,7 @@
               <a:rPr lang="en-US" sz="1050" smtClean="0">
                 <a:latin typeface="Consolas" panose="020B0609020204030204" pitchFamily="49" charset="0"/>
               </a:rPr>
-              <a:t>grade_model </a:t>
-            </a:r>
-            <a:r>
-              <a:rPr lang="en-US" sz="1050" smtClean="0">
-                <a:latin typeface="Consolas" panose="020B0609020204030204" pitchFamily="49" charset="0"/>
-              </a:rPr>
-              <a:t>&lt;- rpart(formula = </a:t>
-            </a:r>
-            <a:r>
-              <a:rPr lang="en-US" sz="1050" smtClean="0">
-                <a:latin typeface="Consolas" panose="020B0609020204030204" pitchFamily="49" charset="0"/>
-              </a:rPr>
-              <a:t>final_grade </a:t>
-            </a:r>
-            <a:r>
-              <a:rPr lang="en-US" sz="1050" smtClean="0">
-                <a:latin typeface="Consolas" panose="020B0609020204030204" pitchFamily="49" charset="0"/>
-              </a:rPr>
-              <a:t>~ .,</a:t>
+              <a:t>grade_model &lt;- rpart(formula = final_grade ~ .,</a:t>
             </a:r>
           </a:p>
           <a:p>
@@ -5061,17 +5029,8 @@
               <a:rPr lang="en-US" sz="1050" smtClean="0">
                 <a:latin typeface="Consolas" panose="020B0609020204030204" pitchFamily="49" charset="0"/>
               </a:rPr>
-              <a:t>		   data = </a:t>
-            </a:r>
-            <a:r>
-              <a:rPr lang="en-US" sz="1050" smtClean="0">
-                <a:latin typeface="Consolas" panose="020B0609020204030204" pitchFamily="49" charset="0"/>
-              </a:rPr>
-              <a:t>grade_train,</a:t>
-            </a:r>
-            <a:endParaRPr lang="en-US" sz="1050" smtClean="0">
-              <a:latin typeface="Consolas" panose="020B0609020204030204" pitchFamily="49" charset="0"/>
-            </a:endParaRPr>
+              <a:t>		   data = grade_train,</a:t>
+            </a:r>
           </a:p>
           <a:p>
             <a:r>
@@ -5084,17 +5043,8 @@
               <a:rPr lang="en-US" sz="1050" smtClean="0">
                 <a:latin typeface="Consolas" panose="020B0609020204030204" pitchFamily="49" charset="0"/>
               </a:rPr>
-              <a:t>		   method = </a:t>
-            </a:r>
-            <a:r>
-              <a:rPr lang="en-US" sz="1050" smtClean="0">
-                <a:latin typeface="Consolas" panose="020B0609020204030204" pitchFamily="49" charset="0"/>
-              </a:rPr>
-              <a:t>“anova”)</a:t>
-            </a:r>
-            <a:endParaRPr lang="en-US" sz="1050" smtClean="0">
-              <a:latin typeface="Consolas" panose="020B0609020204030204" pitchFamily="49" charset="0"/>
-            </a:endParaRPr>
+              <a:t>		   method = “anova”)</a:t>
+            </a:r>
           </a:p>
           <a:p>
             <a:endParaRPr lang="en-US" sz="1050">
@@ -5118,13 +5068,7 @@
               <a:rPr lang="en-US" sz="1050" smtClean="0">
                 <a:latin typeface="Consolas" panose="020B0609020204030204" pitchFamily="49" charset="0"/>
               </a:rPr>
-              <a:t>yesno = 2, type = 0, extra = 0</a:t>
-            </a:r>
-            <a:r>
-              <a:rPr lang="en-US" sz="1050" smtClean="0">
-                <a:latin typeface="Consolas" panose="020B0609020204030204" pitchFamily="49" charset="0"/>
-              </a:rPr>
-              <a:t>)</a:t>
+              <a:t>yesno = 2, type = 0, extra = 0)</a:t>
             </a:r>
           </a:p>
           <a:p>
@@ -5275,19 +5219,7 @@
                 </a:solidFill>
                 <a:latin typeface="Consolas" panose="020B0609020204030204" pitchFamily="49" charset="0"/>
               </a:rPr>
-              <a:t>Regression </a:t>
-            </a:r>
-            <a:r>
-              <a:rPr lang="en-US" sz="800" smtClean="0">
-                <a:solidFill>
-                  <a:schemeClr val="accent1">
-                    <a:lumMod val="60000"/>
-                    <a:lumOff val="40000"/>
-                  </a:schemeClr>
-                </a:solidFill>
-                <a:latin typeface="Consolas" panose="020B0609020204030204" pitchFamily="49" charset="0"/>
-              </a:rPr>
-              <a:t>Trees</a:t>
+              <a:t>Regression Trees</a:t>
             </a:r>
             <a:endParaRPr lang="en-US" sz="800" dirty="0">
               <a:solidFill>
@@ -5357,13 +5289,6 @@
               </a:rPr>
               <a:t>Metrics</a:t>
             </a:r>
-            <a:endParaRPr lang="en-US" sz="1000" b="1" smtClean="0">
-              <a:solidFill>
-                <a:schemeClr val="accent2">
-                  <a:lumMod val="75000"/>
-                </a:schemeClr>
-              </a:solidFill>
-            </a:endParaRPr>
           </a:p>
         </p:txBody>
       </p:sp>
@@ -5400,25 +5325,8 @@
                   </a:schemeClr>
                 </a:solidFill>
               </a:rPr>
-              <a:t>you can </a:t>
-            </a:r>
-            <a:r>
-              <a:rPr lang="en-US" sz="1000" b="1" smtClean="0">
-                <a:solidFill>
-                  <a:schemeClr val="accent2">
-                    <a:lumMod val="75000"/>
-                  </a:schemeClr>
-                </a:solidFill>
-              </a:rPr>
-              <a:t>see this model using print(grade_model)</a:t>
-            </a:r>
-            <a:endParaRPr lang="en-US" sz="1000" b="1" smtClean="0">
-              <a:solidFill>
-                <a:schemeClr val="accent2">
-                  <a:lumMod val="75000"/>
-                </a:schemeClr>
-              </a:solidFill>
-            </a:endParaRPr>
+              <a:t>you can see this model using print(grade_model)</a:t>
+            </a:r>
           </a:p>
         </p:txBody>
       </p:sp>
@@ -5932,19 +5840,7 @@
                 </a:solidFill>
                 <a:latin typeface="Consolas" panose="020B0609020204030204" pitchFamily="49" charset="0"/>
               </a:rPr>
-              <a:t>Regression </a:t>
-            </a:r>
-            <a:r>
-              <a:rPr lang="en-US" sz="800" smtClean="0">
-                <a:solidFill>
-                  <a:schemeClr val="accent1">
-                    <a:lumMod val="60000"/>
-                    <a:lumOff val="40000"/>
-                  </a:schemeClr>
-                </a:solidFill>
-                <a:latin typeface="Consolas" panose="020B0609020204030204" pitchFamily="49" charset="0"/>
-              </a:rPr>
-              <a:t>Trees</a:t>
+              <a:t>Regression Trees</a:t>
             </a:r>
             <a:endParaRPr lang="en-US" sz="800" dirty="0">
               <a:solidFill>
@@ -6126,6 +6022,985 @@
     <p:extLst>
       <p:ext uri="{BB962C8B-B14F-4D97-AF65-F5344CB8AC3E}">
         <p14:creationId xmlns:p14="http://schemas.microsoft.com/office/powerpoint/2010/main" val="1595928824"/>
+      </p:ext>
+    </p:extLst>
+  </p:cSld>
+  <p:clrMapOvr>
+    <a:masterClrMapping/>
+  </p:clrMapOvr>
+</p:sld>
+</file>
+
+<file path=ppt/slides/slide7.xml><?xml version="1.0" encoding="utf-8"?>
+<p:sld xmlns:a="http://schemas.openxmlformats.org/drawingml/2006/main" xmlns:r="http://schemas.openxmlformats.org/officeDocument/2006/relationships" xmlns:p="http://schemas.openxmlformats.org/presentationml/2006/main">
+  <p:cSld>
+    <p:spTree>
+      <p:nvGrpSpPr>
+        <p:cNvPr id="1" name=""/>
+        <p:cNvGrpSpPr/>
+        <p:nvPr/>
+      </p:nvGrpSpPr>
+      <p:grpSpPr>
+        <a:xfrm>
+          <a:off x="0" y="0"/>
+          <a:ext cx="0" cy="0"/>
+          <a:chOff x="0" y="0"/>
+          <a:chExt cx="0" cy="0"/>
+        </a:xfrm>
+      </p:grpSpPr>
+      <p:sp>
+        <p:nvSpPr>
+          <p:cNvPr id="4" name="Content Placeholder 3"/>
+          <p:cNvSpPr>
+            <a:spLocks noGrp="1"/>
+          </p:cNvSpPr>
+          <p:nvPr>
+            <p:ph sz="half" idx="1"/>
+          </p:nvPr>
+        </p:nvSpPr>
+        <p:spPr>
+          <a:xfrm>
+            <a:off x="411873" y="500654"/>
+            <a:ext cx="2749680" cy="284405"/>
+          </a:xfrm>
+        </p:spPr>
+        <p:txBody>
+          <a:bodyPr>
+            <a:normAutofit/>
+          </a:bodyPr>
+          <a:lstStyle/>
+          <a:p>
+            <a:pPr marL="0" indent="0">
+              <a:buNone/>
+            </a:pPr>
+            <a:r>
+              <a:rPr lang="en-US" sz="1050" b="1" smtClean="0">
+                <a:solidFill>
+                  <a:schemeClr val="accent2">
+                    <a:lumMod val="75000"/>
+                  </a:schemeClr>
+                </a:solidFill>
+              </a:rPr>
+              <a:t>creditsub </a:t>
+            </a:r>
+            <a:r>
+              <a:rPr lang="en-US" sz="1050" b="1" smtClean="0">
+                <a:solidFill>
+                  <a:schemeClr val="accent2">
+                    <a:lumMod val="75000"/>
+                  </a:schemeClr>
+                </a:solidFill>
+              </a:rPr>
+              <a:t>is a data frame</a:t>
+            </a:r>
+          </a:p>
+          <a:p>
+            <a:pPr marL="0" indent="0">
+              <a:buNone/>
+            </a:pPr>
+            <a:endParaRPr lang="en-US" sz="1050" b="1">
+              <a:solidFill>
+                <a:schemeClr val="accent2">
+                  <a:lumMod val="75000"/>
+                </a:schemeClr>
+              </a:solidFill>
+            </a:endParaRPr>
+          </a:p>
+        </p:txBody>
+      </p:sp>
+      <p:sp>
+        <p:nvSpPr>
+          <p:cNvPr id="11" name="TextBox 10">
+            <a:extLst>
+              <a:ext uri="{FF2B5EF4-FFF2-40B4-BE49-F238E27FC236}">
+                <a16:creationId xmlns:a16="http://schemas.microsoft.com/office/drawing/2014/main" id="{8FA4E600-36BF-419F-B739-8B99F6702248}"/>
+              </a:ext>
+            </a:extLst>
+          </p:cNvPr>
+          <p:cNvSpPr txBox="1"/>
+          <p:nvPr/>
+        </p:nvSpPr>
+        <p:spPr>
+          <a:xfrm>
+            <a:off x="411872" y="1333566"/>
+            <a:ext cx="5032693" cy="4939814"/>
+          </a:xfrm>
+          <a:prstGeom prst="rect">
+            <a:avLst/>
+          </a:prstGeom>
+          <a:noFill/>
+        </p:spPr>
+        <p:txBody>
+          <a:bodyPr wrap="square" rtlCol="0">
+            <a:spAutoFit/>
+          </a:bodyPr>
+          <a:lstStyle/>
+          <a:p>
+            <a:r>
+              <a:rPr lang="en-US" sz="1050" smtClean="0">
+                <a:latin typeface="Consolas" panose="020B0609020204030204" pitchFamily="49" charset="0"/>
+              </a:rPr>
+              <a:t>set.seed(123)</a:t>
+            </a:r>
+            <a:endParaRPr lang="en-US" sz="1050" smtClean="0">
+              <a:latin typeface="Consolas" panose="020B0609020204030204" pitchFamily="49" charset="0"/>
+            </a:endParaRPr>
+          </a:p>
+          <a:p>
+            <a:r>
+              <a:rPr lang="en-US" sz="1050" smtClean="0">
+                <a:latin typeface="Consolas" panose="020B0609020204030204" pitchFamily="49" charset="0"/>
+              </a:rPr>
+              <a:t>credit_model &lt;- bagging(formula = default ~ .,</a:t>
+            </a:r>
+          </a:p>
+          <a:p>
+            <a:r>
+              <a:rPr lang="en-US" sz="1050">
+                <a:latin typeface="Consolas" panose="020B0609020204030204" pitchFamily="49" charset="0"/>
+              </a:rPr>
+              <a:t>	</a:t>
+            </a:r>
+            <a:r>
+              <a:rPr lang="en-US" sz="1050" smtClean="0">
+                <a:latin typeface="Consolas" panose="020B0609020204030204" pitchFamily="49" charset="0"/>
+              </a:rPr>
+              <a:t>		      data = credit_train,  coob = TRUE)</a:t>
+            </a:r>
+          </a:p>
+          <a:p>
+            <a:endParaRPr lang="en-US" sz="1050">
+              <a:latin typeface="Consolas" panose="020B0609020204030204" pitchFamily="49" charset="0"/>
+            </a:endParaRPr>
+          </a:p>
+          <a:p>
+            <a:r>
+              <a:rPr lang="en-US" sz="1050" smtClean="0">
+                <a:latin typeface="Consolas" panose="020B0609020204030204" pitchFamily="49" charset="0"/>
+              </a:rPr>
+              <a:t>credit_pred &lt;- predict(object = credit_model,</a:t>
+            </a:r>
+          </a:p>
+          <a:p>
+            <a:r>
+              <a:rPr lang="en-US" sz="1050">
+                <a:latin typeface="Consolas" panose="020B0609020204030204" pitchFamily="49" charset="0"/>
+              </a:rPr>
+              <a:t>	</a:t>
+            </a:r>
+            <a:r>
+              <a:rPr lang="en-US" sz="1050" smtClean="0">
+                <a:latin typeface="Consolas" panose="020B0609020204030204" pitchFamily="49" charset="0"/>
+              </a:rPr>
+              <a:t>		     newdata = credit_test,</a:t>
+            </a:r>
+            <a:r>
+              <a:rPr lang="en-US" sz="1050" smtClean="0">
+                <a:latin typeface="Consolas" panose="020B0609020204030204" pitchFamily="49" charset="0"/>
+              </a:rPr>
+              <a:t>  type = “class”)</a:t>
+            </a:r>
+          </a:p>
+          <a:p>
+            <a:endParaRPr lang="en-US" sz="1050">
+              <a:latin typeface="Consolas" panose="020B0609020204030204" pitchFamily="49" charset="0"/>
+            </a:endParaRPr>
+          </a:p>
+          <a:p>
+            <a:r>
+              <a:rPr lang="en-US" sz="1050" smtClean="0">
+                <a:latin typeface="Consolas" panose="020B0609020204030204" pitchFamily="49" charset="0"/>
+              </a:rPr>
+              <a:t>auc(actual = ifelse(credit_test$default == “yes”, 1, 0),</a:t>
+            </a:r>
+          </a:p>
+          <a:p>
+            <a:r>
+              <a:rPr lang="en-US" sz="1050">
+                <a:latin typeface="Consolas" panose="020B0609020204030204" pitchFamily="49" charset="0"/>
+              </a:rPr>
+              <a:t>	</a:t>
+            </a:r>
+            <a:r>
+              <a:rPr lang="en-US" sz="1050" smtClean="0">
+                <a:latin typeface="Consolas" panose="020B0609020204030204" pitchFamily="49" charset="0"/>
+              </a:rPr>
+              <a:t>predict = pred[ , “yes”])</a:t>
+            </a:r>
+          </a:p>
+          <a:p>
+            <a:endParaRPr lang="en-US" sz="1050">
+              <a:latin typeface="Consolas" panose="020B0609020204030204" pitchFamily="49" charset="0"/>
+            </a:endParaRPr>
+          </a:p>
+          <a:p>
+            <a:r>
+              <a:rPr lang="en-US" sz="1050" smtClean="0">
+                <a:latin typeface="Consolas" panose="020B0609020204030204" pitchFamily="49" charset="0"/>
+              </a:rPr>
+              <a:t>ctrl &lt;- trainControl(method = “cv”,</a:t>
+            </a:r>
+          </a:p>
+          <a:p>
+            <a:r>
+              <a:rPr lang="en-US" sz="1050">
+                <a:latin typeface="Consolas" panose="020B0609020204030204" pitchFamily="49" charset="0"/>
+              </a:rPr>
+              <a:t>	</a:t>
+            </a:r>
+            <a:r>
+              <a:rPr lang="en-US" sz="1050" smtClean="0">
+                <a:latin typeface="Consolas" panose="020B0609020204030204" pitchFamily="49" charset="0"/>
+              </a:rPr>
+              <a:t>		   number = 5,</a:t>
+            </a:r>
+          </a:p>
+          <a:p>
+            <a:r>
+              <a:rPr lang="en-US" sz="1050">
+                <a:latin typeface="Consolas" panose="020B0609020204030204" pitchFamily="49" charset="0"/>
+              </a:rPr>
+              <a:t>	</a:t>
+            </a:r>
+            <a:r>
+              <a:rPr lang="en-US" sz="1050" smtClean="0">
+                <a:latin typeface="Consolas" panose="020B0609020204030204" pitchFamily="49" charset="0"/>
+              </a:rPr>
+              <a:t>		   clasasProbs = TRUE,</a:t>
+            </a:r>
+          </a:p>
+          <a:p>
+            <a:r>
+              <a:rPr lang="en-US" sz="1050">
+                <a:latin typeface="Consolas" panose="020B0609020204030204" pitchFamily="49" charset="0"/>
+              </a:rPr>
+              <a:t>	</a:t>
+            </a:r>
+            <a:r>
+              <a:rPr lang="en-US" sz="1050" smtClean="0">
+                <a:latin typeface="Consolas" panose="020B0609020204030204" pitchFamily="49" charset="0"/>
+              </a:rPr>
+              <a:t>		   summaryFunction = twoClassSummary)</a:t>
+            </a:r>
+          </a:p>
+          <a:p>
+            <a:endParaRPr lang="en-US" sz="1050">
+              <a:latin typeface="Consolas" panose="020B0609020204030204" pitchFamily="49" charset="0"/>
+            </a:endParaRPr>
+          </a:p>
+          <a:p>
+            <a:r>
+              <a:rPr lang="en-US" sz="1050" smtClean="0">
+                <a:latin typeface="Consolas" panose="020B0609020204030204" pitchFamily="49" charset="0"/>
+              </a:rPr>
+              <a:t>set.seed(1)</a:t>
+            </a:r>
+          </a:p>
+          <a:p>
+            <a:r>
+              <a:rPr lang="en-US" sz="1050" smtClean="0">
+                <a:latin typeface="Consolas" panose="020B0609020204030204" pitchFamily="49" charset="0"/>
+              </a:rPr>
+              <a:t>credit_caret_model &lt;- train(default ~ .,</a:t>
+            </a:r>
+          </a:p>
+          <a:p>
+            <a:r>
+              <a:rPr lang="en-US" sz="1050">
+                <a:latin typeface="Consolas" panose="020B0609020204030204" pitchFamily="49" charset="0"/>
+              </a:rPr>
+              <a:t>	</a:t>
+            </a:r>
+            <a:r>
+              <a:rPr lang="en-US" sz="1050" smtClean="0">
+                <a:latin typeface="Consolas" panose="020B0609020204030204" pitchFamily="49" charset="0"/>
+              </a:rPr>
+              <a:t>			    data = credit_train,</a:t>
+            </a:r>
+          </a:p>
+          <a:p>
+            <a:r>
+              <a:rPr lang="en-US" sz="1050">
+                <a:latin typeface="Consolas" panose="020B0609020204030204" pitchFamily="49" charset="0"/>
+              </a:rPr>
+              <a:t>	</a:t>
+            </a:r>
+            <a:r>
+              <a:rPr lang="en-US" sz="1050" smtClean="0">
+                <a:latin typeface="Consolas" panose="020B0609020204030204" pitchFamily="49" charset="0"/>
+              </a:rPr>
+              <a:t>			    method = “treebag”,</a:t>
+            </a:r>
+          </a:p>
+          <a:p>
+            <a:r>
+              <a:rPr lang="en-US" sz="1050">
+                <a:latin typeface="Consolas" panose="020B0609020204030204" pitchFamily="49" charset="0"/>
+              </a:rPr>
+              <a:t>	</a:t>
+            </a:r>
+            <a:r>
+              <a:rPr lang="en-US" sz="1050" smtClean="0">
+                <a:latin typeface="Consolas" panose="020B0609020204030204" pitchFamily="49" charset="0"/>
+              </a:rPr>
+              <a:t>			    metric = “ROC”,</a:t>
+            </a:r>
+          </a:p>
+          <a:p>
+            <a:r>
+              <a:rPr lang="en-US" sz="1050">
+                <a:latin typeface="Consolas" panose="020B0609020204030204" pitchFamily="49" charset="0"/>
+              </a:rPr>
+              <a:t>	</a:t>
+            </a:r>
+            <a:r>
+              <a:rPr lang="en-US" sz="1050" smtClean="0">
+                <a:latin typeface="Consolas" panose="020B0609020204030204" pitchFamily="49" charset="0"/>
+              </a:rPr>
+              <a:t>			    trControl = ctrl)</a:t>
+            </a:r>
+          </a:p>
+          <a:p>
+            <a:endParaRPr lang="en-US" sz="1050">
+              <a:latin typeface="Consolas" panose="020B0609020204030204" pitchFamily="49" charset="0"/>
+            </a:endParaRPr>
+          </a:p>
+          <a:p>
+            <a:r>
+              <a:rPr lang="en-US" sz="1050" smtClean="0">
+                <a:latin typeface="Consolas" panose="020B0609020204030204" pitchFamily="49" charset="0"/>
+              </a:rPr>
+              <a:t>credit_caret_model$results[ , “ROC”]</a:t>
+            </a:r>
+          </a:p>
+          <a:p>
+            <a:endParaRPr lang="en-US" sz="1050">
+              <a:latin typeface="Consolas" panose="020B0609020204030204" pitchFamily="49" charset="0"/>
+            </a:endParaRPr>
+          </a:p>
+          <a:p>
+            <a:r>
+              <a:rPr lang="en-US" sz="1050">
+                <a:latin typeface="Consolas" panose="020B0609020204030204" pitchFamily="49" charset="0"/>
+              </a:rPr>
+              <a:t>credit_pred &lt;- predict(object = credit_caret_model,</a:t>
+            </a:r>
+          </a:p>
+          <a:p>
+            <a:r>
+              <a:rPr lang="en-US" sz="1050">
+                <a:latin typeface="Consolas" panose="020B0609020204030204" pitchFamily="49" charset="0"/>
+              </a:rPr>
+              <a:t>			     newdata </a:t>
+            </a:r>
+            <a:r>
+              <a:rPr lang="en-US" sz="1050">
+                <a:latin typeface="Consolas" panose="020B0609020204030204" pitchFamily="49" charset="0"/>
+              </a:rPr>
+              <a:t>= </a:t>
+            </a:r>
+            <a:r>
+              <a:rPr lang="en-US" sz="1050" smtClean="0">
+                <a:latin typeface="Consolas" panose="020B0609020204030204" pitchFamily="49" charset="0"/>
+              </a:rPr>
+              <a:t>credit_test, type </a:t>
+            </a:r>
+            <a:r>
+              <a:rPr lang="en-US" sz="1050">
+                <a:latin typeface="Consolas" panose="020B0609020204030204" pitchFamily="49" charset="0"/>
+              </a:rPr>
+              <a:t>= “prob”)</a:t>
+            </a:r>
+          </a:p>
+          <a:p>
+            <a:endParaRPr lang="en-US" sz="1050">
+              <a:latin typeface="Consolas" panose="020B0609020204030204" pitchFamily="49" charset="0"/>
+            </a:endParaRPr>
+          </a:p>
+          <a:p>
+            <a:r>
+              <a:rPr lang="en-US" sz="1050">
+                <a:latin typeface="Consolas" panose="020B0609020204030204" pitchFamily="49" charset="0"/>
+              </a:rPr>
+              <a:t>auc(actual = ifelse(credit_test$default == “yes”, 1, 0),</a:t>
+            </a:r>
+          </a:p>
+          <a:p>
+            <a:r>
+              <a:rPr lang="en-US" sz="1050">
+                <a:latin typeface="Consolas" panose="020B0609020204030204" pitchFamily="49" charset="0"/>
+              </a:rPr>
+              <a:t>	predict = pred[ , “</a:t>
+            </a:r>
+            <a:r>
+              <a:rPr lang="en-US" sz="1050">
+                <a:latin typeface="Consolas" panose="020B0609020204030204" pitchFamily="49" charset="0"/>
+              </a:rPr>
+              <a:t>yes</a:t>
+            </a:r>
+            <a:r>
+              <a:rPr lang="en-US" sz="1050" smtClean="0">
+                <a:latin typeface="Consolas" panose="020B0609020204030204" pitchFamily="49" charset="0"/>
+              </a:rPr>
+              <a:t>”])</a:t>
+            </a:r>
+          </a:p>
+        </p:txBody>
+      </p:sp>
+      <p:sp>
+        <p:nvSpPr>
+          <p:cNvPr id="25" name="TextBox 24">
+            <a:extLst>
+              <a:ext uri="{FF2B5EF4-FFF2-40B4-BE49-F238E27FC236}">
+                <a16:creationId xmlns:a16="http://schemas.microsoft.com/office/drawing/2014/main" id="{8FA4E600-36BF-419F-B739-8B99F6702248}"/>
+              </a:ext>
+            </a:extLst>
+          </p:cNvPr>
+          <p:cNvSpPr txBox="1"/>
+          <p:nvPr/>
+        </p:nvSpPr>
+        <p:spPr>
+          <a:xfrm>
+            <a:off x="8208378" y="6535791"/>
+            <a:ext cx="857928" cy="215444"/>
+          </a:xfrm>
+          <a:prstGeom prst="rect">
+            <a:avLst/>
+          </a:prstGeom>
+          <a:noFill/>
+        </p:spPr>
+        <p:txBody>
+          <a:bodyPr wrap="none" rtlCol="0">
+            <a:spAutoFit/>
+          </a:bodyPr>
+          <a:lstStyle/>
+          <a:p>
+            <a:pPr algn="r"/>
+            <a:r>
+              <a:rPr lang="en-US" sz="800" smtClean="0">
+                <a:solidFill>
+                  <a:schemeClr val="accent1">
+                    <a:lumMod val="60000"/>
+                    <a:lumOff val="40000"/>
+                  </a:schemeClr>
+                </a:solidFill>
+                <a:latin typeface="Consolas" panose="020B0609020204030204" pitchFamily="49" charset="0"/>
+              </a:rPr>
+              <a:t>Bagged Trees</a:t>
+            </a:r>
+            <a:endParaRPr lang="en-US" sz="800" dirty="0">
+              <a:solidFill>
+                <a:schemeClr val="accent1">
+                  <a:lumMod val="60000"/>
+                  <a:lumOff val="40000"/>
+                </a:schemeClr>
+              </a:solidFill>
+              <a:latin typeface="Consolas" panose="020B0609020204030204" pitchFamily="49" charset="0"/>
+            </a:endParaRPr>
+          </a:p>
+        </p:txBody>
+      </p:sp>
+      <p:sp>
+        <p:nvSpPr>
+          <p:cNvPr id="27" name="Content Placeholder 3"/>
+          <p:cNvSpPr>
+            <a:spLocks noGrp="1"/>
+          </p:cNvSpPr>
+          <p:nvPr>
+            <p:ph sz="half" idx="1"/>
+          </p:nvPr>
+        </p:nvSpPr>
+        <p:spPr>
+          <a:xfrm>
+            <a:off x="6502400" y="500654"/>
+            <a:ext cx="2311761" cy="274594"/>
+          </a:xfrm>
+        </p:spPr>
+        <p:txBody>
+          <a:bodyPr>
+            <a:normAutofit/>
+          </a:bodyPr>
+          <a:lstStyle/>
+          <a:p>
+            <a:pPr marL="0" indent="0">
+              <a:buNone/>
+            </a:pPr>
+            <a:r>
+              <a:rPr lang="en-US" sz="1000" b="1" smtClean="0">
+                <a:solidFill>
+                  <a:schemeClr val="accent2">
+                    <a:lumMod val="75000"/>
+                  </a:schemeClr>
+                </a:solidFill>
+              </a:rPr>
+              <a:t>libraries </a:t>
+            </a:r>
+            <a:r>
+              <a:rPr lang="en-US" sz="1000" b="1" smtClean="0">
+                <a:solidFill>
+                  <a:schemeClr val="accent2">
+                    <a:lumMod val="75000"/>
+                  </a:schemeClr>
+                </a:solidFill>
+                <a:sym typeface="Wingdings" panose="05000000000000000000" pitchFamily="2" charset="2"/>
+              </a:rPr>
+              <a:t> </a:t>
+            </a:r>
+            <a:r>
+              <a:rPr lang="en-US" sz="1000" b="1" smtClean="0">
+                <a:solidFill>
+                  <a:schemeClr val="accent2">
+                    <a:lumMod val="75000"/>
+                  </a:schemeClr>
+                </a:solidFill>
+              </a:rPr>
+              <a:t>ipred, Metrics, caret</a:t>
+            </a:r>
+            <a:endParaRPr lang="en-US" sz="1000" b="1" smtClean="0">
+              <a:solidFill>
+                <a:schemeClr val="accent2">
+                  <a:lumMod val="75000"/>
+                </a:schemeClr>
+              </a:solidFill>
+            </a:endParaRPr>
+          </a:p>
+        </p:txBody>
+      </p:sp>
+      <p:sp>
+        <p:nvSpPr>
+          <p:cNvPr id="3" name="TextBox 2"/>
+          <p:cNvSpPr txBox="1"/>
+          <p:nvPr/>
+        </p:nvSpPr>
+        <p:spPr>
+          <a:xfrm>
+            <a:off x="411873" y="828480"/>
+            <a:ext cx="4557017" cy="461665"/>
+          </a:xfrm>
+          <a:prstGeom prst="rect">
+            <a:avLst/>
+          </a:prstGeom>
+          <a:noFill/>
+        </p:spPr>
+        <p:txBody>
+          <a:bodyPr wrap="none" rtlCol="0">
+            <a:spAutoFit/>
+          </a:bodyPr>
+          <a:lstStyle/>
+          <a:p>
+            <a:r>
+              <a:rPr lang="en-US" sz="1200" smtClean="0"/>
+              <a:t>Bagged trees combines many trees with the goal of reducing variance.</a:t>
+            </a:r>
+          </a:p>
+          <a:p>
+            <a:r>
+              <a:rPr lang="en-US" sz="1200" smtClean="0"/>
+              <a:t>Bagging </a:t>
+            </a:r>
+            <a:r>
+              <a:rPr lang="en-US" sz="1200" smtClean="0">
+                <a:sym typeface="Wingdings" panose="05000000000000000000" pitchFamily="2" charset="2"/>
+              </a:rPr>
+              <a:t> Bootstrap Aggregating</a:t>
+            </a:r>
+            <a:endParaRPr lang="en-US" sz="1200"/>
+          </a:p>
+        </p:txBody>
+      </p:sp>
+      <p:pic>
+        <p:nvPicPr>
+          <p:cNvPr id="5" name="Picture 4"/>
+          <p:cNvPicPr>
+            <a:picLocks noChangeAspect="1"/>
+          </p:cNvPicPr>
+          <p:nvPr/>
+        </p:nvPicPr>
+        <p:blipFill>
+          <a:blip r:embed="rId2"/>
+          <a:stretch>
+            <a:fillRect/>
+          </a:stretch>
+        </p:blipFill>
+        <p:spPr>
+          <a:xfrm>
+            <a:off x="5646364" y="1010024"/>
+            <a:ext cx="3100646" cy="2265502"/>
+          </a:xfrm>
+          <a:prstGeom prst="rect">
+            <a:avLst/>
+          </a:prstGeom>
+        </p:spPr>
+      </p:pic>
+      <p:sp>
+        <p:nvSpPr>
+          <p:cNvPr id="14" name="Content Placeholder 3"/>
+          <p:cNvSpPr>
+            <a:spLocks noGrp="1"/>
+          </p:cNvSpPr>
+          <p:nvPr>
+            <p:ph sz="half" idx="1"/>
+          </p:nvPr>
+        </p:nvSpPr>
+        <p:spPr>
+          <a:xfrm>
+            <a:off x="6335059" y="3589319"/>
+            <a:ext cx="2600781" cy="1690745"/>
+          </a:xfrm>
+        </p:spPr>
+        <p:txBody>
+          <a:bodyPr>
+            <a:normAutofit/>
+          </a:bodyPr>
+          <a:lstStyle/>
+          <a:p>
+            <a:pPr marL="0" indent="0">
+              <a:buNone/>
+            </a:pPr>
+            <a:r>
+              <a:rPr lang="en-US" sz="1050" smtClean="0"/>
+              <a:t>In binary classification, we can predict numeric values instead of class labels. In fact, class labels are created only after you use the model to predict a raw, numeric, predicted value for a test point.</a:t>
+            </a:r>
+          </a:p>
+          <a:p>
+            <a:pPr marL="0" indent="0">
+              <a:buNone/>
+            </a:pPr>
+            <a:r>
+              <a:rPr lang="en-US" sz="1050" smtClean="0"/>
+              <a:t>The predicted label is generated by applying a threshold to the predicted value, such that all test points with predicted value greater than the threshold get a label of “1” and points below get a label of “0”.</a:t>
+            </a:r>
+            <a:endParaRPr lang="en-US" sz="800" smtClean="0"/>
+          </a:p>
+        </p:txBody>
+      </p:sp>
+      <p:sp>
+        <p:nvSpPr>
+          <p:cNvPr id="15" name="Content Placeholder 3"/>
+          <p:cNvSpPr>
+            <a:spLocks noGrp="1"/>
+          </p:cNvSpPr>
+          <p:nvPr>
+            <p:ph sz="half" idx="1"/>
+          </p:nvPr>
+        </p:nvSpPr>
+        <p:spPr>
+          <a:xfrm>
+            <a:off x="4344602" y="2946497"/>
+            <a:ext cx="1541964" cy="423273"/>
+          </a:xfrm>
+        </p:spPr>
+        <p:txBody>
+          <a:bodyPr>
+            <a:normAutofit fontScale="92500" lnSpcReduction="10000"/>
+          </a:bodyPr>
+          <a:lstStyle/>
+          <a:p>
+            <a:pPr marL="0" indent="0">
+              <a:buNone/>
+            </a:pPr>
+            <a:r>
+              <a:rPr lang="en-US" sz="1000" b="1" smtClean="0">
+                <a:solidFill>
+                  <a:schemeClr val="accent2">
+                    <a:lumMod val="75000"/>
+                  </a:schemeClr>
+                </a:solidFill>
+              </a:rPr>
+              <a:t>“prob” changes this to a predicted value as opposed to a class label</a:t>
+            </a:r>
+            <a:endParaRPr lang="en-US" sz="1000" b="1" smtClean="0">
+              <a:solidFill>
+                <a:schemeClr val="accent2">
+                  <a:lumMod val="75000"/>
+                </a:schemeClr>
+              </a:solidFill>
+            </a:endParaRPr>
+          </a:p>
+        </p:txBody>
+      </p:sp>
+      <p:sp>
+        <p:nvSpPr>
+          <p:cNvPr id="18" name="Right Arrow 17"/>
+          <p:cNvSpPr/>
+          <p:nvPr/>
+        </p:nvSpPr>
+        <p:spPr>
+          <a:xfrm rot="15023629">
+            <a:off x="4665043" y="2577440"/>
+            <a:ext cx="566914" cy="152796"/>
+          </a:xfrm>
+          <a:prstGeom prst="rightArrow">
+            <a:avLst/>
+          </a:prstGeom>
+        </p:spPr>
+        <p:style>
+          <a:lnRef idx="2">
+            <a:schemeClr val="accent1">
+              <a:shade val="50000"/>
+            </a:schemeClr>
+          </a:lnRef>
+          <a:fillRef idx="1">
+            <a:schemeClr val="accent1"/>
+          </a:fillRef>
+          <a:effectRef idx="0">
+            <a:schemeClr val="accent1"/>
+          </a:effectRef>
+          <a:fontRef idx="minor">
+            <a:schemeClr val="lt1"/>
+          </a:fontRef>
+        </p:style>
+        <p:txBody>
+          <a:bodyPr rtlCol="0" anchor="ctr"/>
+          <a:lstStyle/>
+          <a:p>
+            <a:pPr algn="ctr"/>
+            <a:endParaRPr lang="en-US"/>
+          </a:p>
+        </p:txBody>
+      </p:sp>
+      <p:sp>
+        <p:nvSpPr>
+          <p:cNvPr id="19" name="Content Placeholder 3"/>
+          <p:cNvSpPr>
+            <a:spLocks noGrp="1"/>
+          </p:cNvSpPr>
+          <p:nvPr>
+            <p:ph sz="half" idx="1"/>
+          </p:nvPr>
+        </p:nvSpPr>
+        <p:spPr>
+          <a:xfrm>
+            <a:off x="4536107" y="4517612"/>
+            <a:ext cx="1541964" cy="337042"/>
+          </a:xfrm>
+        </p:spPr>
+        <p:txBody>
+          <a:bodyPr>
+            <a:normAutofit fontScale="92500" lnSpcReduction="10000"/>
+          </a:bodyPr>
+          <a:lstStyle/>
+          <a:p>
+            <a:pPr marL="0" indent="0" algn="ctr">
+              <a:buNone/>
+            </a:pPr>
+            <a:r>
+              <a:rPr lang="en-US" sz="1000" b="1" smtClean="0">
+                <a:solidFill>
+                  <a:schemeClr val="accent2">
+                    <a:lumMod val="75000"/>
+                  </a:schemeClr>
+                </a:solidFill>
+              </a:rPr>
+              <a:t>model object</a:t>
+            </a:r>
+            <a:r>
+              <a:rPr lang="en-US" sz="1000" b="1">
+                <a:solidFill>
+                  <a:schemeClr val="accent2">
+                    <a:lumMod val="75000"/>
+                  </a:schemeClr>
+                </a:solidFill>
+              </a:rPr>
+              <a:t/>
+            </a:r>
+            <a:br>
+              <a:rPr lang="en-US" sz="1000" b="1">
+                <a:solidFill>
+                  <a:schemeClr val="accent2">
+                    <a:lumMod val="75000"/>
+                  </a:schemeClr>
+                </a:solidFill>
+              </a:rPr>
+            </a:br>
+            <a:r>
+              <a:rPr lang="en-US" sz="1000" b="1" smtClean="0">
+                <a:solidFill>
+                  <a:schemeClr val="accent2">
+                    <a:lumMod val="75000"/>
+                  </a:schemeClr>
+                </a:solidFill>
+              </a:rPr>
+              <a:t>names(credit_caret_model)</a:t>
+            </a:r>
+          </a:p>
+        </p:txBody>
+      </p:sp>
+      <p:sp>
+        <p:nvSpPr>
+          <p:cNvPr id="20" name="Right Arrow 19"/>
+          <p:cNvSpPr/>
+          <p:nvPr/>
+        </p:nvSpPr>
+        <p:spPr>
+          <a:xfrm rot="12064605">
+            <a:off x="4105231" y="4375175"/>
+            <a:ext cx="788302" cy="152796"/>
+          </a:xfrm>
+          <a:prstGeom prst="rightArrow">
+            <a:avLst/>
+          </a:prstGeom>
+        </p:spPr>
+        <p:style>
+          <a:lnRef idx="2">
+            <a:schemeClr val="accent1">
+              <a:shade val="50000"/>
+            </a:schemeClr>
+          </a:lnRef>
+          <a:fillRef idx="1">
+            <a:schemeClr val="accent1"/>
+          </a:fillRef>
+          <a:effectRef idx="0">
+            <a:schemeClr val="accent1"/>
+          </a:effectRef>
+          <a:fontRef idx="minor">
+            <a:schemeClr val="lt1"/>
+          </a:fontRef>
+        </p:style>
+        <p:txBody>
+          <a:bodyPr rtlCol="0" anchor="ctr"/>
+          <a:lstStyle/>
+          <a:p>
+            <a:pPr algn="ctr"/>
+            <a:endParaRPr lang="en-US"/>
+          </a:p>
+        </p:txBody>
+      </p:sp>
+      <p:sp>
+        <p:nvSpPr>
+          <p:cNvPr id="23" name="Content Placeholder 3"/>
+          <p:cNvSpPr>
+            <a:spLocks noGrp="1"/>
+          </p:cNvSpPr>
+          <p:nvPr>
+            <p:ph sz="half" idx="1"/>
+          </p:nvPr>
+        </p:nvSpPr>
+        <p:spPr>
+          <a:xfrm>
+            <a:off x="4104126" y="1166889"/>
+            <a:ext cx="1298330" cy="337042"/>
+          </a:xfrm>
+        </p:spPr>
+        <p:txBody>
+          <a:bodyPr>
+            <a:normAutofit fontScale="92500" lnSpcReduction="10000"/>
+          </a:bodyPr>
+          <a:lstStyle/>
+          <a:p>
+            <a:pPr marL="0" indent="0" algn="ctr">
+              <a:buNone/>
+            </a:pPr>
+            <a:r>
+              <a:rPr lang="en-US" sz="1000" b="1" smtClean="0">
+                <a:solidFill>
+                  <a:schemeClr val="accent2">
+                    <a:lumMod val="75000"/>
+                  </a:schemeClr>
+                </a:solidFill>
+              </a:rPr>
+              <a:t>model object</a:t>
+            </a:r>
+            <a:r>
+              <a:rPr lang="en-US" sz="1000" b="1">
+                <a:solidFill>
+                  <a:schemeClr val="accent2">
+                    <a:lumMod val="75000"/>
+                  </a:schemeClr>
+                </a:solidFill>
+              </a:rPr>
+              <a:t/>
+            </a:r>
+            <a:br>
+              <a:rPr lang="en-US" sz="1000" b="1">
+                <a:solidFill>
+                  <a:schemeClr val="accent2">
+                    <a:lumMod val="75000"/>
+                  </a:schemeClr>
+                </a:solidFill>
+              </a:rPr>
+            </a:br>
+            <a:r>
+              <a:rPr lang="en-US" sz="1000" b="1" smtClean="0">
+                <a:solidFill>
+                  <a:schemeClr val="accent2">
+                    <a:lumMod val="75000"/>
+                  </a:schemeClr>
+                </a:solidFill>
+              </a:rPr>
+              <a:t>names(credit_model)</a:t>
+            </a:r>
+          </a:p>
+        </p:txBody>
+      </p:sp>
+      <p:sp>
+        <p:nvSpPr>
+          <p:cNvPr id="24" name="Right Arrow 23"/>
+          <p:cNvSpPr/>
+          <p:nvPr/>
+        </p:nvSpPr>
+        <p:spPr>
+          <a:xfrm rot="10282481">
+            <a:off x="3382216" y="1320641"/>
+            <a:ext cx="788302" cy="152796"/>
+          </a:xfrm>
+          <a:prstGeom prst="rightArrow">
+            <a:avLst/>
+          </a:prstGeom>
+        </p:spPr>
+        <p:style>
+          <a:lnRef idx="2">
+            <a:schemeClr val="accent1">
+              <a:shade val="50000"/>
+            </a:schemeClr>
+          </a:lnRef>
+          <a:fillRef idx="1">
+            <a:schemeClr val="accent1"/>
+          </a:fillRef>
+          <a:effectRef idx="0">
+            <a:schemeClr val="accent1"/>
+          </a:effectRef>
+          <a:fontRef idx="minor">
+            <a:schemeClr val="lt1"/>
+          </a:fontRef>
+        </p:style>
+        <p:txBody>
+          <a:bodyPr rtlCol="0" anchor="ctr"/>
+          <a:lstStyle/>
+          <a:p>
+            <a:pPr algn="ctr"/>
+            <a:endParaRPr lang="en-US"/>
+          </a:p>
+        </p:txBody>
+      </p:sp>
+      <p:pic>
+        <p:nvPicPr>
+          <p:cNvPr id="6" name="Picture 5"/>
+          <p:cNvPicPr>
+            <a:picLocks noChangeAspect="1"/>
+          </p:cNvPicPr>
+          <p:nvPr/>
+        </p:nvPicPr>
+        <p:blipFill>
+          <a:blip r:embed="rId3"/>
+          <a:stretch>
+            <a:fillRect/>
+          </a:stretch>
+        </p:blipFill>
+        <p:spPr>
+          <a:xfrm>
+            <a:off x="5307089" y="5559134"/>
+            <a:ext cx="2612903" cy="1024732"/>
+          </a:xfrm>
+          <a:prstGeom prst="rect">
+            <a:avLst/>
+          </a:prstGeom>
+        </p:spPr>
+      </p:pic>
+    </p:spTree>
+    <p:extLst>
+      <p:ext uri="{BB962C8B-B14F-4D97-AF65-F5344CB8AC3E}">
+        <p14:creationId xmlns:p14="http://schemas.microsoft.com/office/powerpoint/2010/main" val="4180235199"/>
       </p:ext>
     </p:extLst>
   </p:cSld>

</xml_diff>